<commit_message>
image fixes for preface and ch 1 #220
</commit_message>
<xml_diff>
--- a/images/experiments/src/anatomy.pptx
+++ b/images/experiments/src/anatomy.pptx
@@ -1477,7 +1477,7 @@
           <a:p>
             <a:fld id="{29172650-02F0-7744-B755-7A2E23C1108C}" type="datetimeFigureOut">
               <a:rPr lang="en-US" smtClean="0"/>
-              <a:t>9/30/22</a:t>
+              <a:t>12/18/23</a:t>
             </a:fld>
             <a:endParaRPr lang="en-US"/>
           </a:p>
@@ -1675,7 +1675,7 @@
           <a:p>
             <a:fld id="{29172650-02F0-7744-B755-7A2E23C1108C}" type="datetimeFigureOut">
               <a:rPr lang="en-US" smtClean="0"/>
-              <a:t>9/30/22</a:t>
+              <a:t>12/18/23</a:t>
             </a:fld>
             <a:endParaRPr lang="en-US"/>
           </a:p>
@@ -1883,7 +1883,7 @@
           <a:p>
             <a:fld id="{29172650-02F0-7744-B755-7A2E23C1108C}" type="datetimeFigureOut">
               <a:rPr lang="en-US" smtClean="0"/>
-              <a:t>9/30/22</a:t>
+              <a:t>12/18/23</a:t>
             </a:fld>
             <a:endParaRPr lang="en-US"/>
           </a:p>
@@ -2081,7 +2081,7 @@
           <a:p>
             <a:fld id="{29172650-02F0-7744-B755-7A2E23C1108C}" type="datetimeFigureOut">
               <a:rPr lang="en-US" smtClean="0"/>
-              <a:t>9/30/22</a:t>
+              <a:t>12/18/23</a:t>
             </a:fld>
             <a:endParaRPr lang="en-US"/>
           </a:p>
@@ -2356,7 +2356,7 @@
           <a:p>
             <a:fld id="{29172650-02F0-7744-B755-7A2E23C1108C}" type="datetimeFigureOut">
               <a:rPr lang="en-US" smtClean="0"/>
-              <a:t>9/30/22</a:t>
+              <a:t>12/18/23</a:t>
             </a:fld>
             <a:endParaRPr lang="en-US"/>
           </a:p>
@@ -2621,7 +2621,7 @@
           <a:p>
             <a:fld id="{29172650-02F0-7744-B755-7A2E23C1108C}" type="datetimeFigureOut">
               <a:rPr lang="en-US" smtClean="0"/>
-              <a:t>9/30/22</a:t>
+              <a:t>12/18/23</a:t>
             </a:fld>
             <a:endParaRPr lang="en-US"/>
           </a:p>
@@ -3033,7 +3033,7 @@
           <a:p>
             <a:fld id="{29172650-02F0-7744-B755-7A2E23C1108C}" type="datetimeFigureOut">
               <a:rPr lang="en-US" smtClean="0"/>
-              <a:t>9/30/22</a:t>
+              <a:t>12/18/23</a:t>
             </a:fld>
             <a:endParaRPr lang="en-US"/>
           </a:p>
@@ -3174,7 +3174,7 @@
           <a:p>
             <a:fld id="{29172650-02F0-7744-B755-7A2E23C1108C}" type="datetimeFigureOut">
               <a:rPr lang="en-US" smtClean="0"/>
-              <a:t>9/30/22</a:t>
+              <a:t>12/18/23</a:t>
             </a:fld>
             <a:endParaRPr lang="en-US"/>
           </a:p>
@@ -3287,7 +3287,7 @@
           <a:p>
             <a:fld id="{29172650-02F0-7744-B755-7A2E23C1108C}" type="datetimeFigureOut">
               <a:rPr lang="en-US" smtClean="0"/>
-              <a:t>9/30/22</a:t>
+              <a:t>12/18/23</a:t>
             </a:fld>
             <a:endParaRPr lang="en-US"/>
           </a:p>
@@ -3598,7 +3598,7 @@
           <a:p>
             <a:fld id="{29172650-02F0-7744-B755-7A2E23C1108C}" type="datetimeFigureOut">
               <a:rPr lang="en-US" smtClean="0"/>
-              <a:t>9/30/22</a:t>
+              <a:t>12/18/23</a:t>
             </a:fld>
             <a:endParaRPr lang="en-US"/>
           </a:p>
@@ -3886,7 +3886,7 @@
           <a:p>
             <a:fld id="{29172650-02F0-7744-B755-7A2E23C1108C}" type="datetimeFigureOut">
               <a:rPr lang="en-US" smtClean="0"/>
-              <a:t>9/30/22</a:t>
+              <a:t>12/18/23</a:t>
             </a:fld>
             <a:endParaRPr lang="en-US"/>
           </a:p>
@@ -4127,7 +4127,7 @@
           <a:p>
             <a:fld id="{29172650-02F0-7744-B755-7A2E23C1108C}" type="datetimeFigureOut">
               <a:rPr lang="en-US" smtClean="0"/>
-              <a:t>9/30/22</a:t>
+              <a:t>12/18/23</a:t>
             </a:fld>
             <a:endParaRPr lang="en-US"/>
           </a:p>
@@ -4610,7 +4610,7 @@
         <p:spPr>
           <a:xfrm>
             <a:off x="1183992" y="521204"/>
-            <a:ext cx="1225592" cy="369332"/>
+            <a:ext cx="1186543" cy="338554"/>
           </a:xfrm>
           <a:prstGeom prst="rect">
             <a:avLst/>
@@ -4624,7 +4624,10 @@
           <a:lstStyle/>
           <a:p>
             <a:r>
-              <a:rPr lang="en-US" b="1" dirty="0"/>
+              <a:rPr lang="en-US" sz="1600" b="1" dirty="0">
+                <a:latin typeface="Source Sans Pro" panose="020B0503030403020204" pitchFamily="34" charset="0"/>
+                <a:ea typeface="Source Sans Pro" panose="020B0503030403020204" pitchFamily="34" charset="0"/>
+              </a:rPr>
               <a:t>Population</a:t>
             </a:r>
           </a:p>
@@ -4768,7 +4771,7 @@
         <p:spPr>
           <a:xfrm>
             <a:off x="1620658" y="1086933"/>
-            <a:ext cx="889987" cy="369332"/>
+            <a:ext cx="864339" cy="338554"/>
           </a:xfrm>
           <a:prstGeom prst="rect">
             <a:avLst/>
@@ -4782,7 +4785,10 @@
           <a:lstStyle/>
           <a:p>
             <a:r>
-              <a:rPr lang="en-US" b="1" dirty="0"/>
+              <a:rPr lang="en-US" sz="1600" b="1" dirty="0">
+                <a:latin typeface="Source Sans Pro" panose="020B0503030403020204" pitchFamily="34" charset="0"/>
+                <a:ea typeface="Source Sans Pro" panose="020B0503030403020204" pitchFamily="34" charset="0"/>
+              </a:rPr>
               <a:t>Sample</a:t>
             </a:r>
           </a:p>
@@ -6180,8 +6186,8 @@
           </mc:AlternateContent>
         </p:grpSp>
       </p:grpSp>
-      <mc:AlternateContent xmlns:mc="http://schemas.openxmlformats.org/markup-compatibility/2006">
-        <mc:Choice xmlns:p14="http://schemas.microsoft.com/office/powerpoint/2010/main" Requires="p14">
+      <mc:AlternateContent xmlns:mc="http://schemas.openxmlformats.org/markup-compatibility/2006" xmlns:p14="http://schemas.microsoft.com/office/powerpoint/2010/main">
+        <mc:Choice Requires="p14">
           <p:contentPart p14:bwMode="auto" r:id="rId36">
             <p14:nvContentPartPr>
               <p14:cNvPr id="127" name="Ink 126">
@@ -6200,7 +6206,7 @@
             </p14:xfrm>
           </p:contentPart>
         </mc:Choice>
-        <mc:Fallback>
+        <mc:Fallback xmlns="">
           <p:pic>
             <p:nvPicPr>
               <p:cNvPr id="127" name="Ink 126">
@@ -6246,7 +6252,7 @@
         <p:spPr>
           <a:xfrm>
             <a:off x="3028004" y="1086933"/>
-            <a:ext cx="1477777" cy="369332"/>
+            <a:ext cx="1388522" cy="338554"/>
           </a:xfrm>
           <a:prstGeom prst="rect">
             <a:avLst/>
@@ -6262,7 +6268,10 @@
           <a:lstStyle/>
           <a:p>
             <a:r>
-              <a:rPr lang="en-US" b="1" dirty="0"/>
+              <a:rPr lang="en-US" sz="1600" b="1" dirty="0">
+                <a:latin typeface="Source Sans Pro" panose="020B0503030403020204" pitchFamily="34" charset="0"/>
+                <a:ea typeface="Source Sans Pro" panose="020B0503030403020204" pitchFamily="34" charset="0"/>
+              </a:rPr>
               <a:t>Manipulation</a:t>
             </a:r>
           </a:p>
@@ -6282,8 +6291,8 @@
         </p:nvSpPr>
         <p:spPr>
           <a:xfrm>
-            <a:off x="2784526" y="1648087"/>
-            <a:ext cx="1972638" cy="923330"/>
+            <a:off x="2784526" y="1698887"/>
+            <a:ext cx="1972638" cy="830997"/>
           </a:xfrm>
           <a:prstGeom prst="rect">
             <a:avLst/>
@@ -6298,21 +6307,30 @@
           <a:p>
             <a:pPr algn="ctr"/>
             <a:r>
-              <a:rPr lang="en-US" dirty="0"/>
+              <a:rPr lang="en-US" sz="1600" dirty="0">
+                <a:latin typeface="Source Sans Pro" panose="020B0503030403020204" pitchFamily="34" charset="0"/>
+                <a:ea typeface="Source Sans Pro" panose="020B0503030403020204" pitchFamily="34" charset="0"/>
+              </a:rPr>
               <a:t>Experimental</a:t>
             </a:r>
           </a:p>
           <a:p>
             <a:pPr algn="ctr"/>
             <a:r>
-              <a:rPr lang="en-US" dirty="0"/>
+              <a:rPr lang="en-US" sz="1600" dirty="0">
+                <a:latin typeface="Source Sans Pro" panose="020B0503030403020204" pitchFamily="34" charset="0"/>
+                <a:ea typeface="Source Sans Pro" panose="020B0503030403020204" pitchFamily="34" charset="0"/>
+              </a:rPr>
               <a:t>(treatment)</a:t>
             </a:r>
           </a:p>
           <a:p>
             <a:pPr algn="ctr"/>
             <a:r>
-              <a:rPr lang="en-US" dirty="0"/>
+              <a:rPr lang="en-US" sz="1600" dirty="0">
+                <a:latin typeface="Source Sans Pro" panose="020B0503030403020204" pitchFamily="34" charset="0"/>
+                <a:ea typeface="Source Sans Pro" panose="020B0503030403020204" pitchFamily="34" charset="0"/>
+              </a:rPr>
               <a:t>condition</a:t>
             </a:r>
           </a:p>
@@ -6332,8 +6350,8 @@
         </p:nvSpPr>
         <p:spPr>
           <a:xfrm>
-            <a:off x="2784526" y="2776925"/>
-            <a:ext cx="1972638" cy="646331"/>
+            <a:off x="2772734" y="2829057"/>
+            <a:ext cx="1972638" cy="584775"/>
           </a:xfrm>
           <a:prstGeom prst="rect">
             <a:avLst/>
@@ -6348,14 +6366,20 @@
           <a:p>
             <a:pPr algn="ctr"/>
             <a:r>
-              <a:rPr lang="en-US" dirty="0"/>
+              <a:rPr lang="en-US" sz="1600" dirty="0">
+                <a:latin typeface="Source Sans Pro" panose="020B0503030403020204" pitchFamily="34" charset="0"/>
+                <a:ea typeface="Source Sans Pro" panose="020B0503030403020204" pitchFamily="34" charset="0"/>
+              </a:rPr>
               <a:t>Control</a:t>
             </a:r>
           </a:p>
           <a:p>
             <a:pPr algn="ctr"/>
             <a:r>
-              <a:rPr lang="en-US" dirty="0"/>
+              <a:rPr lang="en-US" sz="1600" dirty="0">
+                <a:latin typeface="Source Sans Pro" panose="020B0503030403020204" pitchFamily="34" charset="0"/>
+                <a:ea typeface="Source Sans Pro" panose="020B0503030403020204" pitchFamily="34" charset="0"/>
+              </a:rPr>
               <a:t>condition</a:t>
             </a:r>
           </a:p>
@@ -6376,7 +6400,7 @@
         <p:spPr>
           <a:xfrm>
             <a:off x="4647808" y="2386824"/>
-            <a:ext cx="1972638" cy="369332"/>
+            <a:ext cx="1972638" cy="338554"/>
           </a:xfrm>
           <a:prstGeom prst="rect">
             <a:avLst/>
@@ -6391,7 +6415,10 @@
           <a:p>
             <a:pPr algn="ctr"/>
             <a:r>
-              <a:rPr lang="en-US" dirty="0"/>
+              <a:rPr lang="en-US" sz="1600" dirty="0">
+                <a:latin typeface="Source Sans Pro" panose="020B0503030403020204" pitchFamily="34" charset="0"/>
+                <a:ea typeface="Source Sans Pro" panose="020B0503030403020204" pitchFamily="34" charset="0"/>
+              </a:rPr>
               <a:t>Outcome</a:t>
             </a:r>
           </a:p>
@@ -6571,8 +6598,8 @@
           </p:pic>
         </mc:Fallback>
       </mc:AlternateContent>
-      <mc:AlternateContent xmlns:mc="http://schemas.openxmlformats.org/markup-compatibility/2006">
-        <mc:Choice xmlns:p14="http://schemas.microsoft.com/office/powerpoint/2010/main" Requires="p14">
+      <mc:AlternateContent xmlns:mc="http://schemas.openxmlformats.org/markup-compatibility/2006" xmlns:p14="http://schemas.microsoft.com/office/powerpoint/2010/main">
+        <mc:Choice Requires="p14">
           <p:contentPart p14:bwMode="auto" r:id="rId44">
             <p14:nvContentPartPr>
               <p14:cNvPr id="156" name="Ink 155">
@@ -6591,7 +6618,7 @@
             </p14:xfrm>
           </p:contentPart>
         </mc:Choice>
-        <mc:Fallback>
+        <mc:Fallback xmlns="">
           <p:pic>
             <p:nvPicPr>
               <p:cNvPr id="156" name="Ink 155">
@@ -6622,8 +6649,8 @@
           </p:pic>
         </mc:Fallback>
       </mc:AlternateContent>
-      <mc:AlternateContent xmlns:mc="http://schemas.openxmlformats.org/markup-compatibility/2006">
-        <mc:Choice xmlns:p14="http://schemas.microsoft.com/office/powerpoint/2010/main" Requires="p14">
+      <mc:AlternateContent xmlns:mc="http://schemas.openxmlformats.org/markup-compatibility/2006" xmlns:p14="http://schemas.microsoft.com/office/powerpoint/2010/main">
+        <mc:Choice Requires="p14">
           <p:contentPart p14:bwMode="auto" r:id="rId46">
             <p14:nvContentPartPr>
               <p14:cNvPr id="159" name="Ink 158">
@@ -6642,7 +6669,7 @@
             </p14:xfrm>
           </p:contentPart>
         </mc:Choice>
-        <mc:Fallback>
+        <mc:Fallback xmlns="">
           <p:pic>
             <p:nvPicPr>
               <p:cNvPr id="159" name="Ink 158">
@@ -6673,8 +6700,8 @@
           </p:pic>
         </mc:Fallback>
       </mc:AlternateContent>
-      <mc:AlternateContent xmlns:mc="http://schemas.openxmlformats.org/markup-compatibility/2006">
-        <mc:Choice xmlns:p14="http://schemas.microsoft.com/office/powerpoint/2010/main" Requires="p14">
+      <mc:AlternateContent xmlns:mc="http://schemas.openxmlformats.org/markup-compatibility/2006" xmlns:p14="http://schemas.microsoft.com/office/powerpoint/2010/main">
+        <mc:Choice Requires="p14">
           <p:contentPart p14:bwMode="auto" r:id="rId48">
             <p14:nvContentPartPr>
               <p14:cNvPr id="160" name="Ink 159">
@@ -6693,7 +6720,7 @@
             </p14:xfrm>
           </p:contentPart>
         </mc:Choice>
-        <mc:Fallback>
+        <mc:Fallback xmlns="">
           <p:pic>
             <p:nvPicPr>
               <p:cNvPr id="160" name="Ink 159">
@@ -6724,8 +6751,8 @@
           </p:pic>
         </mc:Fallback>
       </mc:AlternateContent>
-      <mc:AlternateContent xmlns:mc="http://schemas.openxmlformats.org/markup-compatibility/2006">
-        <mc:Choice xmlns:p14="http://schemas.microsoft.com/office/powerpoint/2010/main" Requires="p14">
+      <mc:AlternateContent xmlns:mc="http://schemas.openxmlformats.org/markup-compatibility/2006" xmlns:p14="http://schemas.microsoft.com/office/powerpoint/2010/main">
+        <mc:Choice Requires="p14">
           <p:contentPart p14:bwMode="auto" r:id="rId50">
             <p14:nvContentPartPr>
               <p14:cNvPr id="164" name="Ink 163">
@@ -6744,7 +6771,7 @@
             </p14:xfrm>
           </p:contentPart>
         </mc:Choice>
-        <mc:Fallback>
+        <mc:Fallback xmlns="">
           <p:pic>
             <p:nvPicPr>
               <p:cNvPr id="164" name="Ink 163">
@@ -7174,8 +7201,8 @@
           </mc:Fallback>
         </mc:AlternateContent>
       </p:grpSp>
-      <mc:AlternateContent xmlns:mc="http://schemas.openxmlformats.org/markup-compatibility/2006">
-        <mc:Choice xmlns:p14="http://schemas.microsoft.com/office/powerpoint/2010/main" Requires="p14">
+      <mc:AlternateContent xmlns:mc="http://schemas.openxmlformats.org/markup-compatibility/2006" xmlns:p14="http://schemas.microsoft.com/office/powerpoint/2010/main">
+        <mc:Choice Requires="p14">
           <p:contentPart p14:bwMode="auto" r:id="rId66">
             <p14:nvContentPartPr>
               <p14:cNvPr id="180" name="Ink 179">
@@ -7194,7 +7221,7 @@
             </p14:xfrm>
           </p:contentPart>
         </mc:Choice>
-        <mc:Fallback>
+        <mc:Fallback xmlns="">
           <p:pic>
             <p:nvPicPr>
               <p:cNvPr id="180" name="Ink 179">
@@ -7240,7 +7267,7 @@
         <p:spPr>
           <a:xfrm>
             <a:off x="3411743" y="521204"/>
-            <a:ext cx="2152293" cy="369332"/>
+            <a:ext cx="2152293" cy="338554"/>
           </a:xfrm>
           <a:prstGeom prst="rect">
             <a:avLst/>
@@ -7257,7 +7284,10 @@
           <a:p>
             <a:pPr algn="ctr"/>
             <a:r>
-              <a:rPr lang="en-US" b="1" dirty="0"/>
+              <a:rPr lang="en-US" sz="1600" b="1" dirty="0">
+                <a:latin typeface="Source Sans Pro" panose="020B0503030403020204" pitchFamily="34" charset="0"/>
+                <a:ea typeface="Source Sans Pro" panose="020B0503030403020204" pitchFamily="34" charset="0"/>
+              </a:rPr>
               <a:t>Experimental design</a:t>
             </a:r>
           </a:p>
@@ -7277,14 +7307,14 @@
         </p:nvGrpSpPr>
         <p:grpSpPr>
           <a:xfrm rot="16200000">
-            <a:off x="381647" y="2248325"/>
-            <a:ext cx="1914120" cy="646331"/>
-            <a:chOff x="2969933" y="1002549"/>
-            <a:chExt cx="1914120" cy="646331"/>
+            <a:off x="393379" y="2267378"/>
+            <a:ext cx="1914120" cy="608229"/>
+            <a:chOff x="2969933" y="1033330"/>
+            <a:chExt cx="1914120" cy="608229"/>
           </a:xfrm>
         </p:grpSpPr>
-        <mc:AlternateContent xmlns:mc="http://schemas.openxmlformats.org/markup-compatibility/2006">
-          <mc:Choice xmlns:p14="http://schemas.microsoft.com/office/powerpoint/2010/main" Requires="p14">
+        <mc:AlternateContent xmlns:mc="http://schemas.openxmlformats.org/markup-compatibility/2006" xmlns:p14="http://schemas.microsoft.com/office/powerpoint/2010/main">
+          <mc:Choice Requires="p14">
             <p:contentPart p14:bwMode="auto" r:id="rId68">
               <p14:nvContentPartPr>
                 <p14:cNvPr id="183" name="Ink 182">
@@ -7303,7 +7333,7 @@
               </p14:xfrm>
             </p:contentPart>
           </mc:Choice>
-          <mc:Fallback>
+          <mc:Fallback xmlns="">
             <p:pic>
               <p:nvPicPr>
                 <p:cNvPr id="183" name="Ink 182">
@@ -7348,8 +7378,8 @@
           </p:nvSpPr>
           <p:spPr>
             <a:xfrm>
-              <a:off x="3306682" y="1002549"/>
-              <a:ext cx="1268321" cy="646331"/>
+              <a:off x="3306684" y="1033330"/>
+              <a:ext cx="1268321" cy="584775"/>
             </a:xfrm>
             <a:prstGeom prst="rect">
               <a:avLst/>
@@ -7366,15 +7396,18 @@
             <a:p>
               <a:pPr algn="ctr"/>
               <a:r>
-                <a:rPr lang="en-US" b="1" dirty="0"/>
+                <a:rPr lang="en-US" sz="1600" b="1" dirty="0">
+                  <a:latin typeface="Source Sans Pro" panose="020B0503030403020204" pitchFamily="34" charset="0"/>
+                  <a:ea typeface="Source Sans Pro" panose="020B0503030403020204" pitchFamily="34" charset="0"/>
+                </a:rPr>
                 <a:t>Random assignment</a:t>
               </a:r>
             </a:p>
           </p:txBody>
         </p:sp>
       </p:grpSp>
-      <mc:AlternateContent xmlns:mc="http://schemas.openxmlformats.org/markup-compatibility/2006">
-        <mc:Choice xmlns:p14="http://schemas.microsoft.com/office/powerpoint/2010/main" Requires="p14">
+      <mc:AlternateContent xmlns:mc="http://schemas.openxmlformats.org/markup-compatibility/2006" xmlns:p14="http://schemas.microsoft.com/office/powerpoint/2010/main">
+        <mc:Choice Requires="p14">
           <p:contentPart p14:bwMode="auto" r:id="rId70">
             <p14:nvContentPartPr>
               <p14:cNvPr id="186" name="Ink 185">
@@ -7393,7 +7426,7 @@
             </p14:xfrm>
           </p:contentPart>
         </mc:Choice>
-        <mc:Fallback>
+        <mc:Fallback xmlns="">
           <p:pic>
             <p:nvPicPr>
               <p:cNvPr id="186" name="Ink 185">
@@ -7439,7 +7472,7 @@
         <p:spPr>
           <a:xfrm>
             <a:off x="5087536" y="1086933"/>
-            <a:ext cx="1025281" cy="369332"/>
+            <a:ext cx="950901" cy="338554"/>
           </a:xfrm>
           <a:prstGeom prst="rect">
             <a:avLst/>
@@ -7455,7 +7488,10 @@
           <a:lstStyle/>
           <a:p>
             <a:r>
-              <a:rPr lang="en-US" b="1" dirty="0"/>
+              <a:rPr lang="en-US" sz="1600" b="1" dirty="0">
+                <a:latin typeface="Source Sans Pro" panose="020B0503030403020204" pitchFamily="34" charset="0"/>
+                <a:ea typeface="Source Sans Pro" panose="020B0503030403020204" pitchFamily="34" charset="0"/>
+              </a:rPr>
               <a:t>Measure</a:t>
             </a:r>
           </a:p>

</xml_diff>